<commit_message>
add compare init data
good
</commit_message>
<xml_diff>
--- a/cmpo_running_notes.pptx
+++ b/cmpo_running_notes.pptx
@@ -19,6 +19,7 @@
     <p:sldId id="264" r:id="rId12"/>
     <p:sldId id="265" r:id="rId13"/>
     <p:sldId id="266" r:id="rId14"/>
+    <p:sldId id="267" r:id="rId15"/>
   </p:sldIdLst>
   <p:sldSz cx="12192000" cy="6858000"/>
   <p:notesSz cx="7103745" cy="10234295"/>
@@ -511,6 +512,114 @@
 </p:notes>
 </file>
 
+<file path=ppt/notesSlides/notesSlide10.xml><?xml version="1.0" encoding="utf-8"?>
+<p:notes xmlns:a="http://schemas.openxmlformats.org/drawingml/2006/main" xmlns:r="http://schemas.openxmlformats.org/officeDocument/2006/relationships" xmlns:p="http://schemas.openxmlformats.org/presentationml/2006/main">
+  <p:cSld>
+    <p:spTree>
+      <p:nvGrpSpPr>
+        <p:cNvPr id="1" name=""/>
+        <p:cNvGrpSpPr/>
+        <p:nvPr/>
+      </p:nvGrpSpPr>
+      <p:grpSpPr/>
+      <p:sp>
+        <p:nvSpPr>
+          <p:cNvPr id="2" name="Slide Image Placeholder 1"/>
+          <p:cNvSpPr/>
+          <p:nvPr>
+            <p:ph type="sldImg" idx="2"/>
+          </p:nvPr>
+        </p:nvSpPr>
+        <p:spPr/>
+      </p:sp>
+      <p:sp>
+        <p:nvSpPr>
+          <p:cNvPr id="3" name="Text Placeholder 2"/>
+          <p:cNvSpPr/>
+          <p:nvPr>
+            <p:ph type="body" idx="3"/>
+          </p:nvPr>
+        </p:nvSpPr>
+        <p:spPr/>
+        <p:txBody>
+          <a:bodyPr/>
+          <a:p>
+            <a:r>
+              <a:rPr lang="en-US"/>
+              <a:t>init ++-|， gamma = 0, 后一步用前一步结果</a:t>
+            </a:r>
+            <a:endParaRPr lang="en-US"/>
+          </a:p>
+        </p:txBody>
+      </p:sp>
+    </p:spTree>
+  </p:cSld>
+  <p:clrMapOvr>
+    <a:masterClrMapping/>
+  </p:clrMapOvr>
+</p:notes>
+</file>
+
+<file path=ppt/notesSlides/notesSlide11.xml><?xml version="1.0" encoding="utf-8"?>
+<p:notes xmlns:a="http://schemas.openxmlformats.org/drawingml/2006/main" xmlns:r="http://schemas.openxmlformats.org/officeDocument/2006/relationships" xmlns:p="http://schemas.openxmlformats.org/presentationml/2006/main">
+  <p:cSld>
+    <p:spTree>
+      <p:nvGrpSpPr>
+        <p:cNvPr id="1" name=""/>
+        <p:cNvGrpSpPr/>
+        <p:nvPr/>
+      </p:nvGrpSpPr>
+      <p:grpSpPr/>
+      <p:sp>
+        <p:nvSpPr>
+          <p:cNvPr id="2" name="Slide Image Placeholder 1"/>
+          <p:cNvSpPr/>
+          <p:nvPr>
+            <p:ph type="sldImg" idx="2"/>
+          </p:nvPr>
+        </p:nvSpPr>
+        <p:spPr/>
+      </p:sp>
+      <p:sp>
+        <p:nvSpPr>
+          <p:cNvPr id="3" name="Text Placeholder 2"/>
+          <p:cNvSpPr/>
+          <p:nvPr>
+            <p:ph type="body" idx="3"/>
+          </p:nvPr>
+        </p:nvSpPr>
+        <p:spPr/>
+        <p:txBody>
+          <a:bodyPr/>
+          <a:p>
+            <a:r>
+              <a:rPr lang="en-US"/>
+              <a:t>init ++-|</a:t>
+            </a:r>
+            <a:r>
+              <a:rPr lang="zh-CN" altLang="en-US"/>
+              <a:t>， </a:t>
+            </a:r>
+            <a:r>
+              <a:rPr lang="en-US" altLang="zh-CN"/>
+              <a:t>gamma = 0, </a:t>
+            </a:r>
+            <a:r>
+              <a:rPr lang="zh-CN" altLang="en-US"/>
+              <a:t>后一步用前一步结果</a:t>
+            </a:r>
+            <a:endParaRPr lang="zh-CN" altLang="en-US"/>
+          </a:p>
+        </p:txBody>
+      </p:sp>
+    </p:spTree>
+  </p:cSld>
+  <p:clrMapOvr>
+    <a:masterClrMapping/>
+  </p:clrMapOvr>
+</p:notes>
+</file>
+
 <file path=ppt/notesSlides/notesSlide2.xml><?xml version="1.0" encoding="utf-8"?>
 <p:notes xmlns:a="http://schemas.openxmlformats.org/drawingml/2006/main" xmlns:r="http://schemas.openxmlformats.org/officeDocument/2006/relationships" xmlns:p="http://schemas.openxmlformats.org/presentationml/2006/main">
   <p:cSld>
@@ -543,10 +652,6 @@
         <p:txBody>
           <a:bodyPr/>
           <a:p>
-            <a:r>
-              <a:rPr lang="en-US"/>
-              <a:t>fixed init : ++-|</a:t>
-            </a:r>
             <a:endParaRPr lang="en-US"/>
           </a:p>
         </p:txBody>
@@ -593,9 +698,17 @@
           <a:p>
             <a:r>
               <a:rPr lang="en-US"/>
-              <a:t>high-T init : use \beta = 1 optimized states to init \beta = 20</a:t>
-            </a:r>
-            <a:endParaRPr lang="en-US"/>
+              <a:t>high-T init</a:t>
+            </a:r>
+            <a:r>
+              <a:rPr lang="zh-CN" altLang="en-US"/>
+              <a:t>： </a:t>
+            </a:r>
+            <a:r>
+              <a:rPr lang="en-US" altLang="zh-CN"/>
+              <a:t>init beta = 20 cmps by beta = 1cmps</a:t>
+            </a:r>
+            <a:endParaRPr lang="en-US" altLang="zh-CN"/>
           </a:p>
         </p:txBody>
       </p:sp>
@@ -640,8 +753,22 @@
           <a:bodyPr/>
           <a:p>
             <a:r>
-              <a:rPr lang="en-US"/>
-              <a:t>fixed init ++-| from now on</a:t>
+              <a:rPr lang="en-US">
+                <a:sym typeface="+mn-ea"/>
+              </a:rPr>
+              <a:t>high-T init</a:t>
+            </a:r>
+            <a:r>
+              <a:rPr lang="zh-CN" altLang="en-US">
+                <a:sym typeface="+mn-ea"/>
+              </a:rPr>
+              <a:t>： </a:t>
+            </a:r>
+            <a:r>
+              <a:rPr lang="en-US" altLang="zh-CN">
+                <a:sym typeface="+mn-ea"/>
+              </a:rPr>
+              <a:t>init beta = 20 cmps by beta = 1cmps</a:t>
             </a:r>
             <a:endParaRPr lang="en-US"/>
           </a:p>
@@ -689,7 +816,7 @@
           <a:p>
             <a:r>
               <a:rPr lang="en-US"/>
-              <a:t>init ++-|</a:t>
+              <a:t>fixed init ++-| from now on</a:t>
             </a:r>
             <a:endParaRPr lang="en-US"/>
           </a:p>
@@ -785,7 +912,15 @@
           <a:p>
             <a:r>
               <a:rPr lang="en-US"/>
-              <a:t>init ++-|</a:t>
+              <a:t>for every gamma</a:t>
+            </a:r>
+            <a:r>
+              <a:rPr lang="zh-CN" altLang="en-US"/>
+              <a:t>， </a:t>
+            </a:r>
+            <a:r>
+              <a:rPr lang="en-US"/>
+              <a:t>init cmps = ++-|</a:t>
             </a:r>
             <a:endParaRPr lang="en-US"/>
           </a:p>
@@ -832,22 +967,24 @@
           <a:bodyPr/>
           <a:p>
             <a:r>
-              <a:rPr lang="en-US"/>
-              <a:t>init ++-|</a:t>
-            </a:r>
-            <a:r>
-              <a:rPr lang="zh-CN" altLang="en-US"/>
+              <a:rPr lang="en-US">
+                <a:sym typeface="+mn-ea"/>
+              </a:rPr>
+              <a:t>for every gamma</a:t>
+            </a:r>
+            <a:r>
+              <a:rPr lang="zh-CN" altLang="en-US">
+                <a:sym typeface="+mn-ea"/>
+              </a:rPr>
               <a:t>， </a:t>
             </a:r>
             <a:r>
-              <a:rPr lang="en-US" altLang="zh-CN"/>
-              <a:t>gamma = 0, </a:t>
-            </a:r>
-            <a:r>
-              <a:rPr lang="zh-CN" altLang="en-US"/>
-              <a:t>后一步用前一步结果</a:t>
-            </a:r>
-            <a:endParaRPr lang="zh-CN" altLang="en-US"/>
+              <a:rPr lang="en-US">
+                <a:sym typeface="+mn-ea"/>
+              </a:rPr>
+              <a:t>init cmps = ++-|</a:t>
+            </a:r>
+            <a:endParaRPr lang="en-US"/>
           </a:p>
         </p:txBody>
       </p:sp>
@@ -893,9 +1030,21 @@
           <a:p>
             <a:r>
               <a:rPr lang="en-US"/>
-              <a:t>init ++-|， gamma = 0, 后一步用前一步结果</a:t>
-            </a:r>
-            <a:endParaRPr lang="en-US"/>
+              <a:t>init ++-|</a:t>
+            </a:r>
+            <a:r>
+              <a:rPr lang="zh-CN" altLang="en-US"/>
+              <a:t>， </a:t>
+            </a:r>
+            <a:r>
+              <a:rPr lang="en-US" altLang="zh-CN"/>
+              <a:t>gamma = 0, </a:t>
+            </a:r>
+            <a:r>
+              <a:rPr lang="zh-CN" altLang="en-US"/>
+              <a:t>后一步用前一步结果</a:t>
+            </a:r>
+            <a:endParaRPr lang="zh-CN" altLang="en-US"/>
           </a:p>
         </p:txBody>
       </p:sp>
@@ -3512,7 +3661,7 @@
           <a:p>
             <a:r>
               <a:rPr lang="en-US"/>
-              <a:t>2020.03.25 :   β=10, 20 free energy loss</a:t>
+              <a:t>++-|, g[1]:  β=10, 20 free energy loss</a:t>
             </a:r>
             <a:endParaRPr lang="en-US"/>
           </a:p>
@@ -3606,8 +3755,14 @@
           </a:bodyPr>
           <a:p>
             <a:r>
+              <a:rPr lang="en-US">
+                <a:sym typeface="+mn-ea"/>
+              </a:rPr>
+              <a:t>++-|, g[1]:</a:t>
+            </a:r>
+            <a:r>
               <a:rPr lang="en-US"/>
-              <a:t>2020.03.25 :   β=10, 20 &lt; sx &gt;</a:t>
+              <a:t>  β=10, 20 &lt; sx &gt;</a:t>
             </a:r>
             <a:endParaRPr lang="en-US"/>
           </a:p>
@@ -3654,6 +3809,101 @@
         <p:spPr>
           <a:xfrm>
             <a:off x="838200" y="1398905"/>
+            <a:ext cx="5096518" cy="5040000"/>
+          </a:xfrm>
+          <a:prstGeom prst="rect">
+            <a:avLst/>
+          </a:prstGeom>
+        </p:spPr>
+      </p:pic>
+    </p:spTree>
+  </p:cSld>
+  <p:clrMapOvr>
+    <a:masterClrMapping/>
+  </p:clrMapOvr>
+</p:sld>
+</file>
+
+<file path=ppt/slides/slide12.xml><?xml version="1.0" encoding="utf-8"?>
+<p:sld xmlns:a="http://schemas.openxmlformats.org/drawingml/2006/main" xmlns:r="http://schemas.openxmlformats.org/officeDocument/2006/relationships" xmlns:p="http://schemas.openxmlformats.org/presentationml/2006/main">
+  <p:cSld>
+    <p:spTree>
+      <p:nvGrpSpPr>
+        <p:cNvPr id="1" name=""/>
+        <p:cNvGrpSpPr/>
+        <p:nvPr/>
+      </p:nvGrpSpPr>
+      <p:grpSpPr/>
+      <p:sp>
+        <p:nvSpPr>
+          <p:cNvPr id="2" name="Title 1"/>
+          <p:cNvSpPr>
+            <a:spLocks noGrp="1"/>
+          </p:cNvSpPr>
+          <p:nvPr>
+            <p:ph type="title"/>
+          </p:nvPr>
+        </p:nvSpPr>
+        <p:spPr>
+          <a:xfrm>
+            <a:off x="838200" y="192405"/>
+            <a:ext cx="10515600" cy="1325563"/>
+          </a:xfrm>
+        </p:spPr>
+        <p:txBody>
+          <a:bodyPr>
+            <a:normAutofit/>
+          </a:bodyPr>
+          <a:p>
+            <a:r>
+              <a:rPr lang="en-US"/>
+              <a:t>init compare:  β=20 </a:t>
+            </a:r>
+            <a:endParaRPr lang="en-US"/>
+          </a:p>
+        </p:txBody>
+      </p:sp>
+      <p:pic>
+        <p:nvPicPr>
+          <p:cNvPr id="4" name="Picture 3" descr="截屏2021-03-25 下午6.04.27"/>
+          <p:cNvPicPr>
+            <a:picLocks noChangeAspect="1"/>
+          </p:cNvPicPr>
+          <p:nvPr/>
+        </p:nvPicPr>
+        <p:blipFill>
+          <a:blip r:embed="rId1"/>
+          <a:stretch>
+            <a:fillRect/>
+          </a:stretch>
+        </p:blipFill>
+        <p:spPr>
+          <a:xfrm>
+            <a:off x="741680" y="1360805"/>
+            <a:ext cx="5096518" cy="5040000"/>
+          </a:xfrm>
+          <a:prstGeom prst="rect">
+            <a:avLst/>
+          </a:prstGeom>
+        </p:spPr>
+      </p:pic>
+      <p:pic>
+        <p:nvPicPr>
+          <p:cNvPr id="6" name="Picture 5" descr="截屏2021-03-25 下午6.06.25"/>
+          <p:cNvPicPr>
+            <a:picLocks noChangeAspect="1"/>
+          </p:cNvPicPr>
+          <p:nvPr/>
+        </p:nvPicPr>
+        <p:blipFill>
+          <a:blip r:embed="rId2"/>
+          <a:stretch>
+            <a:fillRect/>
+          </a:stretch>
+        </p:blipFill>
+        <p:spPr>
+          <a:xfrm>
+            <a:off x="6441440" y="1360805"/>
             <a:ext cx="5096518" cy="5040000"/>
           </a:xfrm>
           <a:prstGeom prst="rect">
@@ -3860,10 +4110,6 @@
             <p:txBody>
               <a:bodyPr/>
               <a:p>
-                <a:r>
-                  <a:rPr lang="en-US"/>
-                  <a:t>2020.03.23 : </a:t>
-                </a:r>
                 <a14:m>
                   <m:oMath xmlns:m="http://schemas.openxmlformats.org/officeDocument/2006/math">
                     <m:r>
@@ -3995,7 +4241,7 @@
           <a:p>
             <a:r>
               <a:rPr lang="en-US"/>
-              <a:t>2020.03.23 : β=20, Free energy loss </a:t>
+              <a:t>β=20, Free energy loss </a:t>
             </a:r>
             <a:endParaRPr lang="en-US"/>
           </a:p>
@@ -4059,10 +4305,6 @@
             <p:txBody>
               <a:bodyPr/>
               <a:p>
-                <a:r>
-                  <a:rPr lang="en-US"/>
-                  <a:t>2020.03.23 : </a:t>
-                </a:r>
                 <a14:m>
                   <m:oMath xmlns:m="http://schemas.openxmlformats.org/officeDocument/2006/math">
                     <m:r>
@@ -4424,7 +4666,7 @@
           <a:p>
             <a:r>
               <a:rPr lang="en-US"/>
-              <a:t>2020.03.25 :  Cool, &lt; sx &gt;</a:t>
+              <a:t>Cool, &lt; sx &gt;</a:t>
             </a:r>
             <a:endParaRPr lang="en-US"/>
           </a:p>
@@ -4495,7 +4737,7 @@
           <a:p>
             <a:r>
               <a:rPr lang="en-US"/>
-              <a:t>2020.03.25 :   β=10, 20 free energy loss</a:t>
+              <a:t>++-|: β=10, 20 free energy loss</a:t>
             </a:r>
             <a:endParaRPr lang="en-US"/>
           </a:p>
@@ -4589,8 +4831,14 @@
           </a:bodyPr>
           <a:p>
             <a:r>
+              <a:rPr lang="en-US">
+                <a:sym typeface="+mn-ea"/>
+              </a:rPr>
+              <a:t>++-|:  </a:t>
+            </a:r>
+            <a:r>
               <a:rPr lang="en-US"/>
-              <a:t>2020.03.25 :   β=10, 20 &lt; sx &gt;</a:t>
+              <a:t>β=10, 20 &lt; sx &gt;</a:t>
             </a:r>
             <a:endParaRPr lang="en-US"/>
           </a:p>

</xml_diff>

<commit_message>
add critical point g = 1 zz(0,tau) result
</commit_message>
<xml_diff>
--- a/cmpo_running_notes.pptx
+++ b/cmpo_running_notes.pptx
@@ -20,6 +20,11 @@
     <p:sldId id="265" r:id="rId13"/>
     <p:sldId id="266" r:id="rId14"/>
     <p:sldId id="267" r:id="rId15"/>
+    <p:sldId id="268" r:id="rId16"/>
+    <p:sldId id="271" r:id="rId17"/>
+    <p:sldId id="272" r:id="rId18"/>
+    <p:sldId id="269" r:id="rId19"/>
+    <p:sldId id="270" r:id="rId20"/>
   </p:sldIdLst>
   <p:sldSz cx="12192000" cy="6858000"/>
   <p:notesSz cx="7103745" cy="10234295"/>
@@ -3941,6 +3946,652 @@
               <a:rPr lang="en-US"/>
               <a:t>CMPO works fine even for random init !</a:t>
             </a:r>
+            <a:endParaRPr lang="en-US"/>
+          </a:p>
+        </p:txBody>
+      </p:sp>
+    </p:spTree>
+  </p:cSld>
+  <p:clrMapOvr>
+    <a:masterClrMapping/>
+  </p:clrMapOvr>
+</p:sld>
+</file>
+
+<file path=ppt/slides/slide13.xml><?xml version="1.0" encoding="utf-8"?>
+<p:sld xmlns:a="http://schemas.openxmlformats.org/drawingml/2006/main" xmlns:r="http://schemas.openxmlformats.org/officeDocument/2006/relationships" xmlns:p="http://schemas.openxmlformats.org/presentationml/2006/main">
+  <p:cSld>
+    <p:spTree>
+      <p:nvGrpSpPr>
+        <p:cNvPr id="1" name=""/>
+        <p:cNvGrpSpPr/>
+        <p:nvPr/>
+      </p:nvGrpSpPr>
+      <p:grpSpPr/>
+      <p:sp>
+        <p:nvSpPr>
+          <p:cNvPr id="2" name="Title 1"/>
+          <p:cNvSpPr>
+            <a:spLocks noGrp="1"/>
+          </p:cNvSpPr>
+          <p:nvPr>
+            <p:ph type="title"/>
+          </p:nvPr>
+        </p:nvSpPr>
+        <p:spPr/>
+        <p:txBody>
+          <a:bodyPr/>
+          <a:p>
+            <a:r>
+              <a:rPr lang="en-US"/>
+              <a:t>TFIM: theoretical results</a:t>
+            </a:r>
+            <a:endParaRPr lang="en-US"/>
+          </a:p>
+        </p:txBody>
+      </p:sp>
+      <p:grpSp>
+        <p:nvGrpSpPr>
+          <p:cNvPr id="8" name="Group 7"/>
+          <p:cNvGrpSpPr/>
+          <p:nvPr/>
+        </p:nvGrpSpPr>
+        <p:grpSpPr>
+          <a:xfrm>
+            <a:off x="838200" y="1331595"/>
+            <a:ext cx="9236710" cy="5102225"/>
+            <a:chOff x="1320" y="2097"/>
+            <a:chExt cx="14546" cy="8035"/>
+          </a:xfrm>
+        </p:grpSpPr>
+        <p:grpSp>
+          <p:nvGrpSpPr>
+            <p:cNvPr id="7" name="Group 6"/>
+            <p:cNvGrpSpPr>
+              <a:grpSpLocks noChangeAspect="1"/>
+            </p:cNvGrpSpPr>
+            <p:nvPr/>
+          </p:nvGrpSpPr>
+          <p:grpSpPr>
+            <a:xfrm>
+              <a:off x="1320" y="2097"/>
+              <a:ext cx="13750" cy="6382"/>
+              <a:chOff x="1320" y="2097"/>
+              <a:chExt cx="15840" cy="7352"/>
+            </a:xfrm>
+          </p:grpSpPr>
+          <p:pic>
+            <p:nvPicPr>
+              <p:cNvPr id="4" name="Picture 3" descr="IMG_0343(20210409-111149)"/>
+              <p:cNvPicPr>
+                <a:picLocks noChangeAspect="1"/>
+              </p:cNvPicPr>
+              <p:nvPr/>
+            </p:nvPicPr>
+            <p:blipFill>
+              <a:blip r:embed="rId1"/>
+              <a:stretch>
+                <a:fillRect/>
+              </a:stretch>
+            </p:blipFill>
+            <p:spPr>
+              <a:xfrm>
+                <a:off x="1320" y="2097"/>
+                <a:ext cx="15840" cy="3869"/>
+              </a:xfrm>
+              <a:prstGeom prst="rect">
+                <a:avLst/>
+              </a:prstGeom>
+            </p:spPr>
+          </p:pic>
+          <p:pic>
+            <p:nvPicPr>
+              <p:cNvPr id="5" name="Picture 4" descr="IMG_0344(20210409-111709)"/>
+              <p:cNvPicPr>
+                <a:picLocks noChangeAspect="1"/>
+              </p:cNvPicPr>
+              <p:nvPr/>
+            </p:nvPicPr>
+            <p:blipFill>
+              <a:blip r:embed="rId2"/>
+              <a:stretch>
+                <a:fillRect/>
+              </a:stretch>
+            </p:blipFill>
+            <p:spPr>
+              <a:xfrm>
+                <a:off x="1320" y="5685"/>
+                <a:ext cx="12559" cy="3764"/>
+              </a:xfrm>
+              <a:prstGeom prst="rect">
+                <a:avLst/>
+              </a:prstGeom>
+            </p:spPr>
+          </p:pic>
+        </p:grpSp>
+        <p:pic>
+          <p:nvPicPr>
+            <p:cNvPr id="3" name="Picture 2" descr="IMG_0346(20210409-113859)"/>
+            <p:cNvPicPr>
+              <a:picLocks noChangeAspect="1"/>
+            </p:cNvPicPr>
+            <p:nvPr/>
+          </p:nvPicPr>
+          <p:blipFill>
+            <a:blip r:embed="rId3"/>
+            <a:stretch>
+              <a:fillRect/>
+            </a:stretch>
+          </p:blipFill>
+          <p:spPr>
+            <a:xfrm>
+              <a:off x="1320" y="7774"/>
+              <a:ext cx="14546" cy="2359"/>
+            </a:xfrm>
+            <a:prstGeom prst="rect">
+              <a:avLst/>
+            </a:prstGeom>
+          </p:spPr>
+        </p:pic>
+      </p:grpSp>
+    </p:spTree>
+  </p:cSld>
+  <p:clrMapOvr>
+    <a:masterClrMapping/>
+  </p:clrMapOvr>
+</p:sld>
+</file>
+
+<file path=ppt/slides/slide14.xml><?xml version="1.0" encoding="utf-8"?>
+<p:sld xmlns:a="http://schemas.openxmlformats.org/drawingml/2006/main" xmlns:r="http://schemas.openxmlformats.org/officeDocument/2006/relationships" xmlns:p="http://schemas.openxmlformats.org/presentationml/2006/main">
+  <p:cSld>
+    <p:spTree>
+      <p:nvGrpSpPr>
+        <p:cNvPr id="1" name=""/>
+        <p:cNvGrpSpPr/>
+        <p:nvPr/>
+      </p:nvGrpSpPr>
+      <p:grpSpPr/>
+      <mc:AlternateContent xmlns:mc="http://schemas.openxmlformats.org/markup-compatibility/2006">
+        <mc:Choice xmlns:a14="http://schemas.microsoft.com/office/drawing/2010/main" Requires="a14">
+          <p:sp>
+            <p:nvSpPr>
+              <p:cNvPr id="2" name="Title 1"/>
+              <p:cNvSpPr>
+                <a:spLocks noGrp="1"/>
+              </p:cNvSpPr>
+              <p:nvPr>
+                <p:ph type="title"/>
+              </p:nvPr>
+            </p:nvSpPr>
+            <p:spPr/>
+            <p:txBody>
+              <a:bodyPr/>
+              <a:p>
+                <a:r>
+                  <a:rPr lang="en-US"/>
+                  <a:t>g = 1.0</a:t>
+                </a:r>
+                <a:r>
+                  <a:rPr lang="zh-CN" altLang="en-US"/>
+                  <a:t>，</a:t>
+                </a:r>
+                <a14:m>
+                  <m:oMath xmlns:m="http://schemas.openxmlformats.org/officeDocument/2006/math">
+                    <m:r>
+                      <a:rPr lang="en-US" altLang="zh-CN" i="1">
+                        <a:latin typeface="Cambria Math" charset="0"/>
+                        <a:cs typeface="Cambria Math" charset="0"/>
+                      </a:rPr>
+                      <m:t>∆=</m:t>
+                    </m:r>
+                    <m:r>
+                      <a:rPr lang="en-US" altLang="zh-CN" i="1">
+                        <a:latin typeface="Cambria Math" charset="0"/>
+                        <a:cs typeface="Cambria Math" charset="0"/>
+                      </a:rPr>
+                      <m:t>0</m:t>
+                    </m:r>
+                  </m:oMath>
+                </a14:m>
+                <a:r>
+                  <a:rPr lang="zh-CN" altLang="en-US"/>
+                  <a:t> </a:t>
+                </a:r>
+                <a:r>
+                  <a:rPr lang="en-US" altLang="zh-CN"/>
+                  <a:t>(have exact solutions)</a:t>
+                </a:r>
+                <a:endParaRPr lang="en-US" altLang="zh-CN"/>
+              </a:p>
+            </p:txBody>
+          </p:sp>
+        </mc:Choice>
+        <mc:Fallback>
+          <p:sp>
+            <p:nvSpPr>
+              <p:cNvPr id="2" name="Title 1"/>
+              <p:cNvSpPr>
+                <a:spLocks noRot="1" noChangeAspect="1" noMove="1" noResize="1" noEditPoints="1" noAdjustHandles="1" noChangeArrowheads="1" noChangeShapeType="1" noTextEdit="1"/>
+              </p:cNvSpPr>
+              <p:nvPr>
+                <p:ph type="title"/>
+              </p:nvPr>
+            </p:nvSpPr>
+            <p:spPr>
+              <a:blipFill rotWithShape="1">
+                <a:blip r:embed="rId1"/>
+                <a:stretch>
+                  <a:fillRect b="24"/>
+                </a:stretch>
+              </a:blipFill>
+            </p:spPr>
+            <p:txBody>
+              <a:bodyPr/>
+              <a:lstStyle/>
+              <a:p>
+                <a:r>
+                  <a:rPr lang="en-US" altLang="en-US">
+                    <a:noFill/>
+                  </a:rPr>
+                  <a:t> </a:t>
+                </a:r>
+              </a:p>
+            </p:txBody>
+          </p:sp>
+        </mc:Fallback>
+      </mc:AlternateContent>
+      <p:pic>
+        <p:nvPicPr>
+          <p:cNvPr id="4" name="Picture 3" descr="截屏2021-04-09 下午1.39.17"/>
+          <p:cNvPicPr>
+            <a:picLocks noChangeAspect="1"/>
+          </p:cNvPicPr>
+          <p:nvPr/>
+        </p:nvPicPr>
+        <p:blipFill>
+          <a:blip r:embed="rId2"/>
+          <a:stretch>
+            <a:fillRect/>
+          </a:stretch>
+        </p:blipFill>
+        <p:spPr>
+          <a:xfrm>
+            <a:off x="281305" y="1438275"/>
+            <a:ext cx="6579235" cy="5131435"/>
+          </a:xfrm>
+          <a:prstGeom prst="rect">
+            <a:avLst/>
+          </a:prstGeom>
+        </p:spPr>
+      </p:pic>
+      <p:pic>
+        <p:nvPicPr>
+          <p:cNvPr id="5" name="Picture 4" descr="截屏2021-04-09 下午1.40.51"/>
+          <p:cNvPicPr>
+            <a:picLocks noChangeAspect="1"/>
+          </p:cNvPicPr>
+          <p:nvPr/>
+        </p:nvPicPr>
+        <p:blipFill>
+          <a:blip r:embed="rId3"/>
+          <a:stretch>
+            <a:fillRect/>
+          </a:stretch>
+        </p:blipFill>
+        <p:spPr>
+          <a:xfrm>
+            <a:off x="6767830" y="1829435"/>
+            <a:ext cx="5271135" cy="1043305"/>
+          </a:xfrm>
+          <a:prstGeom prst="rect">
+            <a:avLst/>
+          </a:prstGeom>
+        </p:spPr>
+      </p:pic>
+    </p:spTree>
+  </p:cSld>
+  <p:clrMapOvr>
+    <a:masterClrMapping/>
+  </p:clrMapOvr>
+</p:sld>
+</file>
+
+<file path=ppt/slides/slide15.xml><?xml version="1.0" encoding="utf-8"?>
+<p:sld xmlns:a="http://schemas.openxmlformats.org/drawingml/2006/main" xmlns:r="http://schemas.openxmlformats.org/officeDocument/2006/relationships" xmlns:p="http://schemas.openxmlformats.org/presentationml/2006/main">
+  <p:cSld>
+    <p:spTree>
+      <p:nvGrpSpPr>
+        <p:cNvPr id="1" name=""/>
+        <p:cNvGrpSpPr/>
+        <p:nvPr/>
+      </p:nvGrpSpPr>
+      <p:grpSpPr/>
+      <mc:AlternateContent xmlns:mc="http://schemas.openxmlformats.org/markup-compatibility/2006">
+        <mc:Choice xmlns:a14="http://schemas.microsoft.com/office/drawing/2010/main" Requires="a14">
+          <p:sp>
+            <p:nvSpPr>
+              <p:cNvPr id="2" name="Title 1"/>
+              <p:cNvSpPr>
+                <a:spLocks noGrp="1"/>
+              </p:cNvSpPr>
+              <p:nvPr>
+                <p:ph type="title"/>
+              </p:nvPr>
+            </p:nvSpPr>
+            <p:spPr/>
+            <p:txBody>
+              <a:bodyPr/>
+              <a:p>
+                <a:r>
+                  <a:rPr lang="en-US"/>
+                  <a:t>g = 1.0</a:t>
+                </a:r>
+                <a:r>
+                  <a:rPr lang="zh-CN" altLang="en-US"/>
+                  <a:t>，</a:t>
+                </a:r>
+                <a14:m>
+                  <m:oMath xmlns:m="http://schemas.openxmlformats.org/officeDocument/2006/math">
+                    <m:r>
+                      <a:rPr lang="en-US" altLang="zh-CN" i="1">
+                        <a:latin typeface="Cambria Math" charset="0"/>
+                        <a:cs typeface="Cambria Math" charset="0"/>
+                      </a:rPr>
+                      <m:t>∆=</m:t>
+                    </m:r>
+                    <m:r>
+                      <a:rPr lang="en-US" altLang="zh-CN" i="1">
+                        <a:latin typeface="Cambria Math" charset="0"/>
+                        <a:cs typeface="Cambria Math" charset="0"/>
+                      </a:rPr>
+                      <m:t>0</m:t>
+                    </m:r>
+                  </m:oMath>
+                </a14:m>
+                <a:r>
+                  <a:rPr lang="zh-CN" altLang="en-US"/>
+                  <a:t> </a:t>
+                </a:r>
+                <a:r>
+                  <a:rPr lang="en-US" altLang="zh-CN"/>
+                  <a:t>(have exact solutions)</a:t>
+                </a:r>
+                <a:endParaRPr lang="en-US" altLang="zh-CN"/>
+              </a:p>
+            </p:txBody>
+          </p:sp>
+        </mc:Choice>
+        <mc:Fallback>
+          <p:sp>
+            <p:nvSpPr>
+              <p:cNvPr id="2" name="Title 1"/>
+              <p:cNvSpPr>
+                <a:spLocks noRot="1" noChangeAspect="1" noMove="1" noResize="1" noEditPoints="1" noAdjustHandles="1" noChangeArrowheads="1" noChangeShapeType="1" noTextEdit="1"/>
+              </p:cNvSpPr>
+              <p:nvPr>
+                <p:ph type="title"/>
+              </p:nvPr>
+            </p:nvSpPr>
+            <p:spPr>
+              <a:blipFill rotWithShape="1">
+                <a:blip r:embed="rId1"/>
+                <a:stretch>
+                  <a:fillRect b="24"/>
+                </a:stretch>
+              </a:blipFill>
+            </p:spPr>
+            <p:txBody>
+              <a:bodyPr/>
+              <a:lstStyle/>
+              <a:p>
+                <a:r>
+                  <a:rPr lang="en-US" altLang="en-US">
+                    <a:noFill/>
+                  </a:rPr>
+                  <a:t> </a:t>
+                </a:r>
+              </a:p>
+            </p:txBody>
+          </p:sp>
+        </mc:Fallback>
+      </mc:AlternateContent>
+    </p:spTree>
+  </p:cSld>
+  <p:clrMapOvr>
+    <a:masterClrMapping/>
+  </p:clrMapOvr>
+</p:sld>
+</file>
+
+<file path=ppt/slides/slide16.xml><?xml version="1.0" encoding="utf-8"?>
+<p:sld xmlns:a="http://schemas.openxmlformats.org/drawingml/2006/main" xmlns:r="http://schemas.openxmlformats.org/officeDocument/2006/relationships" xmlns:p="http://schemas.openxmlformats.org/presentationml/2006/main">
+  <p:cSld>
+    <p:spTree>
+      <p:nvGrpSpPr>
+        <p:cNvPr id="1" name=""/>
+        <p:cNvGrpSpPr/>
+        <p:nvPr/>
+      </p:nvGrpSpPr>
+      <p:grpSpPr/>
+      <mc:AlternateContent xmlns:mc="http://schemas.openxmlformats.org/markup-compatibility/2006">
+        <mc:Choice xmlns:a14="http://schemas.microsoft.com/office/drawing/2010/main" Requires="a14">
+          <p:sp>
+            <p:nvSpPr>
+              <p:cNvPr id="2" name="Title 1"/>
+              <p:cNvSpPr>
+                <a:spLocks noGrp="1"/>
+              </p:cNvSpPr>
+              <p:nvPr>
+                <p:ph type="title"/>
+              </p:nvPr>
+            </p:nvSpPr>
+            <p:spPr/>
+            <p:txBody>
+              <a:bodyPr/>
+              <a:p>
+                <a:r>
+                  <a:rPr lang="en-US"/>
+                  <a:t>g = 0.1, </a:t>
+                </a:r>
+                <a14:m>
+                  <m:oMath xmlns:m="http://schemas.openxmlformats.org/officeDocument/2006/math">
+                    <m:r>
+                      <a:rPr lang="en-US" i="1">
+                        <a:latin typeface="Cambria Math" charset="0"/>
+                        <a:cs typeface="Cambria Math" charset="0"/>
+                      </a:rPr>
+                      <m:t>∆ = </m:t>
+                    </m:r>
+                    <m:r>
+                      <a:rPr lang="en-US" i="1">
+                        <a:latin typeface="Cambria Math" charset="0"/>
+                        <a:cs typeface="Cambria Math" charset="0"/>
+                      </a:rPr>
+                      <m:t>1</m:t>
+                    </m:r>
+                    <m:r>
+                      <a:rPr lang="en-US" i="1">
+                        <a:latin typeface="Cambria Math" charset="0"/>
+                        <a:cs typeface="Cambria Math" charset="0"/>
+                      </a:rPr>
+                      <m:t>.</m:t>
+                    </m:r>
+                    <m:r>
+                      <a:rPr lang="en-US" i="1">
+                        <a:latin typeface="Cambria Math" charset="0"/>
+                        <a:cs typeface="Cambria Math" charset="0"/>
+                      </a:rPr>
+                      <m:t>8</m:t>
+                    </m:r>
+                  </m:oMath>
+                </a14:m>
+                <a:endParaRPr lang="en-US"/>
+              </a:p>
+            </p:txBody>
+          </p:sp>
+        </mc:Choice>
+        <mc:Fallback>
+          <p:sp>
+            <p:nvSpPr>
+              <p:cNvPr id="2" name="Title 1"/>
+              <p:cNvSpPr>
+                <a:spLocks noRot="1" noChangeAspect="1" noMove="1" noResize="1" noEditPoints="1" noAdjustHandles="1" noChangeArrowheads="1" noChangeShapeType="1" noTextEdit="1"/>
+              </p:cNvSpPr>
+              <p:nvPr>
+                <p:ph type="title"/>
+              </p:nvPr>
+            </p:nvSpPr>
+            <p:spPr>
+              <a:blipFill rotWithShape="1">
+                <a:blip r:embed="rId1"/>
+                <a:stretch>
+                  <a:fillRect b="24"/>
+                </a:stretch>
+              </a:blipFill>
+            </p:spPr>
+            <p:txBody>
+              <a:bodyPr/>
+              <a:lstStyle/>
+              <a:p>
+                <a:r>
+                  <a:rPr lang="en-US" altLang="en-US">
+                    <a:noFill/>
+                  </a:rPr>
+                  <a:t> </a:t>
+                </a:r>
+              </a:p>
+            </p:txBody>
+          </p:sp>
+        </mc:Fallback>
+      </mc:AlternateContent>
+      <p:sp>
+        <p:nvSpPr>
+          <p:cNvPr id="3" name="Content Placeholder 2"/>
+          <p:cNvSpPr>
+            <a:spLocks noGrp="1"/>
+          </p:cNvSpPr>
+          <p:nvPr>
+            <p:ph idx="1"/>
+          </p:nvPr>
+        </p:nvSpPr>
+        <p:spPr/>
+        <p:txBody>
+          <a:bodyPr/>
+          <a:p>
+            <a:endParaRPr lang="en-US"/>
+          </a:p>
+        </p:txBody>
+      </p:sp>
+    </p:spTree>
+  </p:cSld>
+  <p:clrMapOvr>
+    <a:masterClrMapping/>
+  </p:clrMapOvr>
+</p:sld>
+</file>
+
+<file path=ppt/slides/slide17.xml><?xml version="1.0" encoding="utf-8"?>
+<p:sld xmlns:a="http://schemas.openxmlformats.org/drawingml/2006/main" xmlns:r="http://schemas.openxmlformats.org/officeDocument/2006/relationships" xmlns:p="http://schemas.openxmlformats.org/presentationml/2006/main">
+  <p:cSld>
+    <p:spTree>
+      <p:nvGrpSpPr>
+        <p:cNvPr id="1" name=""/>
+        <p:cNvGrpSpPr/>
+        <p:nvPr/>
+      </p:nvGrpSpPr>
+      <p:grpSpPr/>
+      <mc:AlternateContent xmlns:mc="http://schemas.openxmlformats.org/markup-compatibility/2006">
+        <mc:Choice xmlns:a14="http://schemas.microsoft.com/office/drawing/2010/main" Requires="a14">
+          <p:sp>
+            <p:nvSpPr>
+              <p:cNvPr id="2" name="Title 1"/>
+              <p:cNvSpPr>
+                <a:spLocks noGrp="1"/>
+              </p:cNvSpPr>
+              <p:nvPr>
+                <p:ph type="title"/>
+              </p:nvPr>
+            </p:nvSpPr>
+            <p:spPr/>
+            <p:txBody>
+              <a:bodyPr/>
+              <a:p>
+                <a:r>
+                  <a:rPr lang="en-US"/>
+                  <a:t>g = 2.0, </a:t>
+                </a:r>
+                <a14:m>
+                  <m:oMath xmlns:m="http://schemas.openxmlformats.org/officeDocument/2006/math">
+                    <m:r>
+                      <a:rPr lang="en-US" i="1">
+                        <a:latin typeface="Cambria Math" charset="0"/>
+                        <a:cs typeface="Cambria Math" charset="0"/>
+                      </a:rPr>
+                      <m:t>∆=−</m:t>
+                    </m:r>
+                    <m:r>
+                      <a:rPr lang="en-US" i="1">
+                        <a:latin typeface="Cambria Math" charset="0"/>
+                        <a:cs typeface="Cambria Math" charset="0"/>
+                      </a:rPr>
+                      <m:t>2</m:t>
+                    </m:r>
+                  </m:oMath>
+                </a14:m>
+                <a:endParaRPr lang="en-US"/>
+              </a:p>
+            </p:txBody>
+          </p:sp>
+        </mc:Choice>
+        <mc:Fallback>
+          <p:sp>
+            <p:nvSpPr>
+              <p:cNvPr id="2" name="Title 1"/>
+              <p:cNvSpPr>
+                <a:spLocks noRot="1" noChangeAspect="1" noMove="1" noResize="1" noEditPoints="1" noAdjustHandles="1" noChangeArrowheads="1" noChangeShapeType="1" noTextEdit="1"/>
+              </p:cNvSpPr>
+              <p:nvPr>
+                <p:ph type="title"/>
+              </p:nvPr>
+            </p:nvSpPr>
+            <p:spPr>
+              <a:blipFill rotWithShape="1">
+                <a:blip r:embed="rId1"/>
+                <a:stretch>
+                  <a:fillRect b="24"/>
+                </a:stretch>
+              </a:blipFill>
+            </p:spPr>
+            <p:txBody>
+              <a:bodyPr/>
+              <a:lstStyle/>
+              <a:p>
+                <a:r>
+                  <a:rPr lang="en-US" altLang="en-US">
+                    <a:noFill/>
+                  </a:rPr>
+                  <a:t> </a:t>
+                </a:r>
+              </a:p>
+            </p:txBody>
+          </p:sp>
+        </mc:Fallback>
+      </mc:AlternateContent>
+      <p:sp>
+        <p:nvSpPr>
+          <p:cNvPr id="3" name="Content Placeholder 2"/>
+          <p:cNvSpPr>
+            <a:spLocks noGrp="1"/>
+          </p:cNvSpPr>
+          <p:nvPr>
+            <p:ph idx="1"/>
+          </p:nvPr>
+        </p:nvSpPr>
+        <p:spPr/>
+        <p:txBody>
+          <a:bodyPr/>
+          <a:p>
             <a:endParaRPr lang="en-US"/>
           </a:p>
         </p:txBody>
@@ -5515,25 +6166,4 @@
     </a:ext>
   </a:extLst>
 </a:theme>
-</file>
-
-<file path=customXml/item1.xml><?xml version="1.0" encoding="utf-8"?>
-<s:customData xmlns="http://www.wps.cn/officeDocument/2013/wpsCustomData" xmlns:s="http://www.wps.cn/officeDocument/2013/wpsCustomData">
-  <extobjs>
-    <extobj name="334E55B0-647D-440b-865C-3EC943EB4CBC-2">
-      <extobjdata type="334E55B0-647D-440b-865C-3EC943EB4CBC" data="ewogICAiSW1nU2V0dGluZ0pzb24iIDogIiIsCiAgICJMYXRleCIgOiAiXFxiZWdpbntkaXNwbGF5bWF0aH1cblxcbGFuZ2xlIFxcc2lnbWFeeigwLCB0KSBcXHNpZ21hXnooMCwwKSBcXHJhbmdsZVxuXFxlbmR7ZGlzcGxheW1hdGh9IiwKICAgIkxhdGV4SW1nQmFzZTY0IiA6ICIiCn0K"/>
-    </extobj>
-    <extobj name="334E55B0-647D-440b-865C-3EC943EB4CBC-3">
-      <extobjdata type="334E55B0-647D-440b-865C-3EC943EB4CBC" data="ewogICAiSW1nU2V0dGluZ0pzb24iIDogIiIsCiAgICJMYXRleCIgOiAiXFxiZWdpbntkaXNwbGF5bWF0aH1cblxcRGVsdGEgPSAyKEogLSBcXEdhbW1hKVxuXFxlbmR7ZGlzcGxheW1hdGh9IiwKICAgIkxhdGV4SW1nQmFzZTY0IiA6ICIiCn0K"/>
-    </extobj>
-  </extobjs>
-</s:customData>
-</file>
-
-<file path=customXml/itemProps1.xml><?xml version="1.0" encoding="utf-8"?>
-<ds:datastoreItem xmlns:ds="http://schemas.openxmlformats.org/officeDocument/2006/customXml" ds:itemID="s:customData">
-  <ds:schemaRefs>
-    <ds:schemaRef ds:uri="http://www.wps.cn/officeDocument/2013/wpsCustomData"/>
-  </ds:schemaRefs>
-</ds:datastoreItem>
 </file>
</xml_diff>

<commit_message>
modify g = 1.0 zz correlation fig
</commit_message>
<xml_diff>
--- a/cmpo_running_notes.pptx
+++ b/cmpo_running_notes.pptx
@@ -4203,7 +4203,7 @@
       </mc:AlternateContent>
       <p:pic>
         <p:nvPicPr>
-          <p:cNvPr id="4" name="Picture 3" descr="截屏2021-04-09 下午1.39.17"/>
+          <p:cNvPr id="5" name="Picture 4" descr="截屏2021-04-09 下午1.40.51"/>
           <p:cNvPicPr>
             <a:picLocks noChangeAspect="1"/>
           </p:cNvPicPr>
@@ -4217,8 +4217,8 @@
         </p:blipFill>
         <p:spPr>
           <a:xfrm>
-            <a:off x="281305" y="1438275"/>
-            <a:ext cx="6579235" cy="5131435"/>
+            <a:off x="6767830" y="1829435"/>
+            <a:ext cx="5271135" cy="1043305"/>
           </a:xfrm>
           <a:prstGeom prst="rect">
             <a:avLst/>
@@ -4227,7 +4227,7 @@
       </p:pic>
       <p:pic>
         <p:nvPicPr>
-          <p:cNvPr id="5" name="Picture 4" descr="截屏2021-04-09 下午1.40.51"/>
+          <p:cNvPr id="6" name="Picture 5" descr="截屏2021-04-09 下午4.32.30"/>
           <p:cNvPicPr>
             <a:picLocks noChangeAspect="1"/>
           </p:cNvPicPr>
@@ -4241,8 +4241,8 @@
         </p:blipFill>
         <p:spPr>
           <a:xfrm>
-            <a:off x="6767830" y="1829435"/>
-            <a:ext cx="5271135" cy="1043305"/>
+            <a:off x="115570" y="1590675"/>
+            <a:ext cx="6495415" cy="5078095"/>
           </a:xfrm>
           <a:prstGeom prst="rect">
             <a:avLst/>

</xml_diff>

<commit_message>
add theoretical Im X(w)
</commit_message>
<xml_diff>
--- a/cmpo_running_notes.pptx
+++ b/cmpo_running_notes.pptx
@@ -4678,7 +4678,7 @@
       </mc:AlternateContent>
       <p:pic>
         <p:nvPicPr>
-          <p:cNvPr id="5" name="Picture 4" descr="截屏2021-04-12 下午4.57.06"/>
+          <p:cNvPr id="9" name="Picture 8" descr="截屏2021-04-12 下午5.48.41"/>
           <p:cNvPicPr>
             <a:picLocks noChangeAspect="1"/>
           </p:cNvPicPr>
@@ -4692,8 +4692,8 @@
         </p:blipFill>
         <p:spPr>
           <a:xfrm>
-            <a:off x="604520" y="1877060"/>
-            <a:ext cx="5181600" cy="4214495"/>
+            <a:off x="125095" y="1691005"/>
+            <a:ext cx="5721350" cy="4700270"/>
           </a:xfrm>
           <a:prstGeom prst="rect">
             <a:avLst/>
@@ -4702,7 +4702,7 @@
       </p:pic>
       <p:pic>
         <p:nvPicPr>
-          <p:cNvPr id="6" name="Picture 5" descr="截屏2021-04-12 下午5.00.57"/>
+          <p:cNvPr id="10" name="Picture 9" descr="截屏2021-04-12 下午5.49.20"/>
           <p:cNvPicPr>
             <a:picLocks noChangeAspect="1"/>
           </p:cNvPicPr>
@@ -4716,8 +4716,8 @@
         </p:blipFill>
         <p:spPr>
           <a:xfrm>
-            <a:off x="6181725" y="1811655"/>
-            <a:ext cx="5314950" cy="4345305"/>
+            <a:off x="6031230" y="1691005"/>
+            <a:ext cx="5720715" cy="4700270"/>
           </a:xfrm>
           <a:prstGeom prst="rect">
             <a:avLst/>

</xml_diff>